<commit_message>
update doc files, random benchmark results
</commit_message>
<xml_diff>
--- a/ifl-2021.pptx
+++ b/ifl-2021.pptx
@@ -6206,9 +6206,58 @@
           <a:lstStyle/>
           <a:p>
             <a:r>
-              <a:rPr lang="en-US" dirty="0"/>
-              <a:t>Are these representations easy to use?</a:t>
-            </a:r>
+              <a:rPr lang="en-US" sz="900" dirty="0"/>
+              <a:t>https://</a:t>
+            </a:r>
+            <a:r>
+              <a:rPr lang="en-US" sz="900" dirty="0" err="1"/>
+              <a:t>github.com</a:t>
+            </a:r>
+            <a:r>
+              <a:rPr lang="en-US" sz="900" dirty="0"/>
+              <a:t>/</a:t>
+            </a:r>
+            <a:r>
+              <a:rPr lang="en-US" sz="900" dirty="0" err="1"/>
+              <a:t>sweirich</a:t>
+            </a:r>
+            <a:r>
+              <a:rPr lang="en-US" sz="900" dirty="0"/>
+              <a:t>/lambda-n-ways/</a:t>
+            </a:r>
+          </a:p>
+          <a:p>
+            <a:r>
+              <a:rPr lang="en-US" sz="900" dirty="0" err="1"/>
+              <a:t>Lennart.Simple</a:t>
+            </a:r>
+            <a:r>
+              <a:rPr lang="en-US" sz="900" dirty="0"/>
+              <a:t>: named implementation from "Lambda Calculus Cooked Four Ways"</a:t>
+            </a:r>
+          </a:p>
+          <a:p>
+            <a:r>
+              <a:rPr lang="en-US" sz="900" dirty="0" err="1"/>
+              <a:t>Lennart.DeBruijn</a:t>
+            </a:r>
+            <a:r>
+              <a:rPr lang="en-US" sz="900" dirty="0"/>
+              <a:t>: index implementation from "Lambda Calculus Cooked Four Ways"</a:t>
+            </a:r>
+          </a:p>
+          <a:p>
+            <a:r>
+              <a:rPr lang="en-US" sz="900" dirty="0" err="1"/>
+              <a:t>LocallyNameless.Ott</a:t>
+            </a:r>
+            <a:r>
+              <a:rPr lang="en-US" sz="900" dirty="0"/>
+              <a:t>: Implementation generated by Ott tool, translated to Haskell</a:t>
+            </a:r>
+          </a:p>
+          <a:p>
+            <a:endParaRPr lang="en-US" dirty="0"/>
           </a:p>
         </p:txBody>
       </p:sp>
@@ -12329,7 +12378,7 @@
             </a:pPr>
             <a:r>
               <a:rPr lang="en-US" sz="3200" dirty="0"/>
-              <a:t>(</a:t>
+              <a:t>       (</a:t>
             </a:r>
             <a:r>
               <a:rPr lang="el-GR" sz="3200" dirty="0">
@@ -12582,17 +12631,27 @@
             </a:r>
           </a:p>
           <a:p>
-            <a:pPr marL="0" indent="0" algn="ctr">
+            <a:pPr marL="0" indent="0">
               <a:buNone/>
             </a:pPr>
             <a:r>
-              <a:rPr lang="el-GR" sz="3200" dirty="0">
+              <a:rPr lang="en-US" sz="3200" dirty="0">
                 <a:solidFill>
                   <a:schemeClr val="accent2">
                     <a:lumMod val="75000"/>
                   </a:schemeClr>
                 </a:solidFill>
               </a:rPr>
+              <a:t>     </a:t>
+            </a:r>
+            <a:r>
+              <a:rPr lang="el-GR" sz="3200" dirty="0">
+                <a:solidFill>
+                  <a:schemeClr val="accent2">
+                    <a:lumMod val="75000"/>
+                  </a:schemeClr>
+                </a:solidFill>
+              </a:rPr>
               <a:t>λ</a:t>
             </a:r>
             <a:r>
@@ -12711,7 +12770,10 @@
               <a:rPr lang="el-GR" sz="3200" dirty="0"/>
               <a:t>))</a:t>
             </a:r>
-            <a:endParaRPr lang="en-US" sz="3200" dirty="0"/>
+            <a:r>
+              <a:rPr lang="en-US" sz="3200" dirty="0"/>
+              <a:t>          </a:t>
+            </a:r>
           </a:p>
         </p:txBody>
       </p:sp>
@@ -12970,7 +13032,7 @@
         </p:nvCxnSpPr>
         <p:spPr>
           <a:xfrm>
-            <a:off x="3045204" y="2848859"/>
+            <a:off x="3320776" y="2848859"/>
             <a:ext cx="4994753" cy="0"/>
           </a:xfrm>
           <a:prstGeom prst="line">
@@ -13488,11 +13550,11 @@
           <a:lstStyle/>
           <a:p>
             <a:r>
-              <a:rPr lang="en-US" dirty="0"/>
+              <a:rPr lang="en-US" sz="2400" dirty="0"/>
               <a:t>Names:  </a:t>
             </a:r>
             <a:r>
-              <a:rPr lang="en-US" b="1" dirty="0"/>
+              <a:rPr lang="en-US" sz="2400" b="1" dirty="0"/>
               <a:t>rename bound variables to avoid capture</a:t>
             </a:r>
           </a:p>
@@ -13537,10 +13599,20 @@
             </a:r>
           </a:p>
           <a:p>
+            <a:r>
+              <a:rPr lang="en-US" sz="2400" dirty="0"/>
+              <a:t>de Bruijn: </a:t>
+            </a:r>
+            <a:r>
+              <a:rPr lang="en-US" sz="2400" b="1" dirty="0"/>
+              <a:t>adjust indices</a:t>
+            </a:r>
+          </a:p>
+          <a:p>
             <a:pPr lvl="1"/>
             <a:r>
               <a:rPr lang="en-US" dirty="0"/>
-              <a:t>calculate all variables in </a:t>
+              <a:t>shift free indices in </a:t>
             </a:r>
             <a:r>
               <a:rPr lang="en-US" dirty="0">
@@ -13551,28 +13623,18 @@
                 <a:ea typeface="Menlo" panose="020B0609030804020204" pitchFamily="49" charset="0"/>
                 <a:cs typeface="Menlo" panose="020B0609030804020204" pitchFamily="49" charset="0"/>
               </a:rPr>
-              <a:t>b</a:t>
+              <a:t>a</a:t>
             </a:r>
             <a:r>
               <a:rPr lang="en-US" dirty="0"/>
-              <a:t>, avoid names that have been used</a:t>
-            </a:r>
-          </a:p>
-          <a:p>
+              <a:t> depending on binding depth</a:t>
+            </a:r>
+          </a:p>
+          <a:p>
+            <a:pPr lvl="1"/>
             <a:r>
               <a:rPr lang="en-US" dirty="0"/>
-              <a:t>de Bruijn: </a:t>
-            </a:r>
-            <a:r>
-              <a:rPr lang="en-US" b="1" dirty="0"/>
-              <a:t>adjust indices</a:t>
-            </a:r>
-          </a:p>
-          <a:p>
-            <a:pPr lvl="1"/>
-            <a:r>
-              <a:rPr lang="en-US" dirty="0"/>
-              <a:t>shift free indices in </a:t>
+              <a:t>decrement indices of </a:t>
             </a:r>
             <a:r>
               <a:rPr lang="en-US" dirty="0">
@@ -13583,18 +13645,28 @@
                 <a:ea typeface="Menlo" panose="020B0609030804020204" pitchFamily="49" charset="0"/>
                 <a:cs typeface="Menlo" panose="020B0609030804020204" pitchFamily="49" charset="0"/>
               </a:rPr>
-              <a:t>a</a:t>
+              <a:t>b</a:t>
             </a:r>
             <a:r>
               <a:rPr lang="en-US" dirty="0"/>
-              <a:t> depending on binding depth</a:t>
+              <a:t> because we lost a binder</a:t>
+            </a:r>
+          </a:p>
+          <a:p>
+            <a:r>
+              <a:rPr lang="en-US" sz="2400" dirty="0"/>
+              <a:t>Locally nameless: </a:t>
+            </a:r>
+            <a:r>
+              <a:rPr lang="en-US" sz="2400" b="1" dirty="0"/>
+              <a:t>exchange names/indices</a:t>
             </a:r>
           </a:p>
           <a:p>
             <a:pPr lvl="1"/>
             <a:r>
               <a:rPr lang="en-US" dirty="0"/>
-              <a:t>decrement indices of </a:t>
+              <a:t>invariant: </a:t>
             </a:r>
             <a:r>
               <a:rPr lang="en-US" dirty="0">
@@ -13605,38 +13677,6 @@
                 <a:ea typeface="Menlo" panose="020B0609030804020204" pitchFamily="49" charset="0"/>
                 <a:cs typeface="Menlo" panose="020B0609030804020204" pitchFamily="49" charset="0"/>
               </a:rPr>
-              <a:t>b</a:t>
-            </a:r>
-            <a:r>
-              <a:rPr lang="en-US" dirty="0"/>
-              <a:t> b/c we lose a binder</a:t>
-            </a:r>
-          </a:p>
-          <a:p>
-            <a:r>
-              <a:rPr lang="en-US" dirty="0"/>
-              <a:t>Locally nameless: </a:t>
-            </a:r>
-            <a:r>
-              <a:rPr lang="en-US" b="1" dirty="0"/>
-              <a:t>exchange names/indices</a:t>
-            </a:r>
-          </a:p>
-          <a:p>
-            <a:pPr lvl="1"/>
-            <a:r>
-              <a:rPr lang="en-US" dirty="0"/>
-              <a:t>invariant: </a:t>
-            </a:r>
-            <a:r>
-              <a:rPr lang="en-US" dirty="0">
-                <a:solidFill>
-                  <a:schemeClr val="accent1"/>
-                </a:solidFill>
-                <a:latin typeface="Menlo" panose="020B0609030804020204" pitchFamily="49" charset="0"/>
-                <a:ea typeface="Menlo" panose="020B0609030804020204" pitchFamily="49" charset="0"/>
-                <a:cs typeface="Menlo" panose="020B0609030804020204" pitchFamily="49" charset="0"/>
-              </a:rPr>
               <a:t>a</a:t>
             </a:r>
             <a:r>
@@ -13648,7 +13688,7 @@
             <a:pPr lvl="1"/>
             <a:r>
               <a:rPr lang="en-US" dirty="0"/>
-              <a:t>exchange happens during every traversal, not just substitution</a:t>
+              <a:t>exchange happens during traversal, not substitution</a:t>
             </a:r>
           </a:p>
           <a:p>
@@ -13783,15 +13823,33 @@
                                   </p:childTnLst>
                                 </p:cTn>
                               </p:par>
+                            </p:childTnLst>
+                          </p:cTn>
+                        </p:par>
+                      </p:childTnLst>
+                    </p:cTn>
+                  </p:par>
+                  <p:par>
+                    <p:cTn id="11" fill="hold">
+                      <p:stCondLst>
+                        <p:cond delay="indefinite"/>
+                      </p:stCondLst>
+                      <p:childTnLst>
+                        <p:par>
+                          <p:cTn id="12" fill="hold">
+                            <p:stCondLst>
+                              <p:cond delay="0"/>
+                            </p:stCondLst>
+                            <p:childTnLst>
                               <p:par>
-                                <p:cTn id="11" presetID="1" presetClass="entr" presetSubtype="0" fill="hold" grpId="0" nodeType="withEffect">
+                                <p:cTn id="13" presetID="1" presetClass="entr" presetSubtype="0" fill="hold" grpId="0" nodeType="clickEffect">
                                   <p:stCondLst>
                                     <p:cond delay="0"/>
                                   </p:stCondLst>
                                   <p:childTnLst>
                                     <p:set>
                                       <p:cBhvr>
-                                        <p:cTn id="12" dur="1" fill="hold">
+                                        <p:cTn id="14" dur="1" fill="hold">
                                           <p:stCondLst>
                                             <p:cond delay="0"/>
                                           </p:stCondLst>
@@ -13814,26 +13872,8 @@
                                   </p:childTnLst>
                                 </p:cTn>
                               </p:par>
-                            </p:childTnLst>
-                          </p:cTn>
-                        </p:par>
-                      </p:childTnLst>
-                    </p:cTn>
-                  </p:par>
-                  <p:par>
-                    <p:cTn id="13" fill="hold">
-                      <p:stCondLst>
-                        <p:cond delay="indefinite"/>
-                      </p:stCondLst>
-                      <p:childTnLst>
-                        <p:par>
-                          <p:cTn id="14" fill="hold">
-                            <p:stCondLst>
-                              <p:cond delay="0"/>
-                            </p:stCondLst>
-                            <p:childTnLst>
                               <p:par>
-                                <p:cTn id="15" presetID="1" presetClass="entr" presetSubtype="0" fill="hold" grpId="0" nodeType="clickEffect">
+                                <p:cTn id="15" presetID="1" presetClass="entr" presetSubtype="0" fill="hold" grpId="0" nodeType="withEffect">
                                   <p:stCondLst>
                                     <p:cond delay="0"/>
                                   </p:stCondLst>
@@ -13894,15 +13934,33 @@
                                   </p:childTnLst>
                                 </p:cTn>
                               </p:par>
+                            </p:childTnLst>
+                          </p:cTn>
+                        </p:par>
+                      </p:childTnLst>
+                    </p:cTn>
+                  </p:par>
+                  <p:par>
+                    <p:cTn id="19" fill="hold">
+                      <p:stCondLst>
+                        <p:cond delay="indefinite"/>
+                      </p:stCondLst>
+                      <p:childTnLst>
+                        <p:par>
+                          <p:cTn id="20" fill="hold">
+                            <p:stCondLst>
+                              <p:cond delay="0"/>
+                            </p:stCondLst>
+                            <p:childTnLst>
                               <p:par>
-                                <p:cTn id="19" presetID="1" presetClass="entr" presetSubtype="0" fill="hold" grpId="0" nodeType="withEffect">
+                                <p:cTn id="21" presetID="1" presetClass="entr" presetSubtype="0" fill="hold" grpId="0" nodeType="clickEffect">
                                   <p:stCondLst>
                                     <p:cond delay="0"/>
                                   </p:stCondLst>
                                   <p:childTnLst>
                                     <p:set>
                                       <p:cBhvr>
-                                        <p:cTn id="20" dur="1" fill="hold">
+                                        <p:cTn id="22" dur="1" fill="hold">
                                           <p:stCondLst>
                                             <p:cond delay="0"/>
                                           </p:stCondLst>
@@ -13925,26 +13983,8 @@
                                   </p:childTnLst>
                                 </p:cTn>
                               </p:par>
-                            </p:childTnLst>
-                          </p:cTn>
-                        </p:par>
-                      </p:childTnLst>
-                    </p:cTn>
-                  </p:par>
-                  <p:par>
-                    <p:cTn id="21" fill="hold">
-                      <p:stCondLst>
-                        <p:cond delay="indefinite"/>
-                      </p:stCondLst>
-                      <p:childTnLst>
-                        <p:par>
-                          <p:cTn id="22" fill="hold">
-                            <p:stCondLst>
-                              <p:cond delay="0"/>
-                            </p:stCondLst>
-                            <p:childTnLst>
                               <p:par>
-                                <p:cTn id="23" presetID="1" presetClass="entr" presetSubtype="0" fill="hold" grpId="0" nodeType="clickEffect">
+                                <p:cTn id="23" presetID="1" presetClass="entr" presetSubtype="0" fill="hold" grpId="0" nodeType="withEffect">
                                   <p:stCondLst>
                                     <p:cond delay="0"/>
                                   </p:stCondLst>
@@ -14036,37 +14076,6 @@
                                   </p:childTnLst>
                                 </p:cTn>
                               </p:par>
-                              <p:par>
-                                <p:cTn id="29" presetID="1" presetClass="entr" presetSubtype="0" fill="hold" grpId="0" nodeType="withEffect">
-                                  <p:stCondLst>
-                                    <p:cond delay="0"/>
-                                  </p:stCondLst>
-                                  <p:childTnLst>
-                                    <p:set>
-                                      <p:cBhvr>
-                                        <p:cTn id="30" dur="1" fill="hold">
-                                          <p:stCondLst>
-                                            <p:cond delay="0"/>
-                                          </p:stCondLst>
-                                        </p:cTn>
-                                        <p:tgtEl>
-                                          <p:spTgt spid="3">
-                                            <p:txEl>
-                                              <p:pRg st="10" end="10"/>
-                                            </p:txEl>
-                                          </p:spTgt>
-                                        </p:tgtEl>
-                                        <p:attrNameLst>
-                                          <p:attrName>style.visibility</p:attrName>
-                                        </p:attrNameLst>
-                                      </p:cBhvr>
-                                      <p:to>
-                                        <p:strVal val="visible"/>
-                                      </p:to>
-                                    </p:set>
-                                  </p:childTnLst>
-                                </p:cTn>
-                              </p:par>
                             </p:childTnLst>
                           </p:cTn>
                         </p:par>
@@ -14134,14 +14143,19 @@
             <p:ph type="title"/>
           </p:nvPr>
         </p:nvSpPr>
-        <p:spPr/>
+        <p:spPr>
+          <a:xfrm>
+            <a:off x="623888" y="1640747"/>
+            <a:ext cx="7886700" cy="2139553"/>
+          </a:xfrm>
+        </p:spPr>
         <p:txBody>
           <a:bodyPr/>
           <a:lstStyle/>
           <a:p>
             <a:r>
               <a:rPr lang="en-US" dirty="0"/>
-              <a:t>What does reduction look like?</a:t>
+              <a:t>How to implement reduction?</a:t>
             </a:r>
           </a:p>
         </p:txBody>
@@ -14173,58 +14187,9 @@
           <a:lstStyle/>
           <a:p>
             <a:r>
-              <a:rPr lang="en-US" sz="1600" dirty="0"/>
-              <a:t>https://</a:t>
-            </a:r>
-            <a:r>
-              <a:rPr lang="en-US" sz="1600" dirty="0" err="1"/>
-              <a:t>github.com</a:t>
-            </a:r>
-            <a:r>
-              <a:rPr lang="en-US" sz="1600" dirty="0"/>
-              <a:t>/</a:t>
-            </a:r>
-            <a:r>
-              <a:rPr lang="en-US" sz="1600" dirty="0" err="1"/>
-              <a:t>sweirich</a:t>
-            </a:r>
-            <a:r>
-              <a:rPr lang="en-US" sz="1600" dirty="0"/>
-              <a:t>/lambda-n-ways/</a:t>
-            </a:r>
-          </a:p>
-          <a:p>
-            <a:r>
-              <a:rPr lang="en-US" sz="1600" dirty="0" err="1"/>
-              <a:t>Lennart.Simple</a:t>
-            </a:r>
-            <a:r>
-              <a:rPr lang="en-US" sz="1600" dirty="0"/>
-              <a:t>: named implementation from "Lambda Calculus Cooked Four Ways"</a:t>
-            </a:r>
-          </a:p>
-          <a:p>
-            <a:r>
-              <a:rPr lang="en-US" sz="1600" dirty="0" err="1"/>
-              <a:t>Lennart.DeBruijn</a:t>
-            </a:r>
-            <a:r>
-              <a:rPr lang="en-US" sz="1600" dirty="0"/>
-              <a:t>: index implementation from "Lambda Calculus Cooked Four Ways"</a:t>
-            </a:r>
-          </a:p>
-          <a:p>
-            <a:r>
-              <a:rPr lang="en-US" sz="1600" dirty="0" err="1"/>
-              <a:t>LocallyNameless.Ott</a:t>
-            </a:r>
-            <a:r>
-              <a:rPr lang="en-US" sz="1600" dirty="0"/>
-              <a:t>: Implementation generated by Ott tool, translated to Haskell</a:t>
-            </a:r>
-          </a:p>
-          <a:p>
-            <a:endParaRPr lang="en-US" dirty="0"/>
+              <a:rPr lang="en-US" dirty="0"/>
+              <a:t>How difficult is it to use these three approaches?</a:t>
+            </a:r>
           </a:p>
         </p:txBody>
       </p:sp>
@@ -14244,8 +14209,8 @@
         </p:nvSpPr>
         <p:spPr>
           <a:xfrm>
-            <a:off x="3274929" y="315357"/>
-            <a:ext cx="2950508" cy="1575452"/>
+            <a:off x="3312507" y="760030"/>
+            <a:ext cx="2950508" cy="2083377"/>
           </a:xfrm>
           <a:prstGeom prst="rect">
             <a:avLst/>
@@ -19116,7 +19081,7 @@
         <p:spPr>
           <a:xfrm>
             <a:off x="449517" y="1008439"/>
-            <a:ext cx="8561457" cy="3463799"/>
+            <a:ext cx="8694483" cy="3463799"/>
           </a:xfrm>
         </p:spPr>
         <p:txBody>
@@ -19205,38 +19170,7 @@
                 </a:solidFill>
                 <a:latin typeface="Menlo" panose="020B0609030804020204" pitchFamily="49" charset="0"/>
               </a:rPr>
-              <a:t>N</a:t>
-            </a:r>
-            <a:r>
-              <a:rPr lang="en-US" sz="1800" dirty="0">
-                <a:solidFill>
-                  <a:srgbClr val="333333"/>
-                </a:solidFill>
-                <a:latin typeface="Menlo" panose="020B0609030804020204" pitchFamily="49" charset="0"/>
-              </a:rPr>
-              <a:t> </a:t>
-            </a:r>
-            <a:r>
-              <a:rPr lang="en-US" sz="1800" dirty="0">
-                <a:solidFill>
-                  <a:srgbClr val="7A3E9D"/>
-                </a:solidFill>
-                <a:latin typeface="Menlo" panose="020B0609030804020204" pitchFamily="49" charset="0"/>
-              </a:rPr>
-              <a:t>Exp   </a:t>
-            </a:r>
-            <a:r>
-              <a:rPr lang="en-US" sz="1800" dirty="0">
-                <a:solidFill>
-                  <a:schemeClr val="bg2">
-                    <a:lumMod val="50000"/>
-                  </a:schemeClr>
-                </a:solidFill>
-                <a:latin typeface="Menlo" panose="020B0609030804020204" pitchFamily="49" charset="0"/>
-                <a:ea typeface="Menlo" panose="020B0609030804020204" pitchFamily="49" charset="0"/>
-                <a:cs typeface="Menlo" panose="020B0609030804020204" pitchFamily="49" charset="0"/>
-              </a:rPr>
-              <a:t>-- "freshness monad"</a:t>
+              <a:t>Exp     </a:t>
             </a:r>
             <a:endParaRPr lang="en-US" sz="1800" dirty="0">
               <a:solidFill>
@@ -19328,7 +19262,7 @@
                 </a:solidFill>
                 <a:latin typeface="Menlo" panose="020B0609030804020204" pitchFamily="49" charset="0"/>
               </a:rPr>
-              <a:t> return </a:t>
+              <a:t> </a:t>
             </a:r>
             <a:r>
               <a:rPr lang="en-US" sz="1800" dirty="0">
@@ -19364,7 +19298,7 @@
                 </a:solidFill>
                 <a:latin typeface="Menlo" panose="020B0609030804020204" pitchFamily="49" charset="0"/>
               </a:rPr>
-              <a:t>) </a:t>
+              <a:t>)      </a:t>
             </a:r>
             <a:r>
               <a:rPr lang="en-US" sz="1800" dirty="0">
@@ -19377,7 +19311,7 @@
                 <a:ea typeface="Menlo" panose="020B0609030804020204" pitchFamily="49" charset="0"/>
                 <a:cs typeface="Menlo" panose="020B0609030804020204" pitchFamily="49" charset="0"/>
               </a:rPr>
-              <a:t>-- x is a name or index</a:t>
+              <a:t>-- invariant, no free indices</a:t>
             </a:r>
             <a:endParaRPr lang="en-US" sz="1800" dirty="0">
               <a:solidFill>
@@ -19433,7 +19367,7 @@
                 </a:solidFill>
                 <a:latin typeface="Menlo" panose="020B0609030804020204" pitchFamily="49" charset="0"/>
               </a:rPr>
-              <a:t> b</a:t>
+              <a:t> </a:t>
             </a:r>
             <a:r>
               <a:rPr lang="en-US" sz="1800" dirty="0">
@@ -19442,7 +19376,34 @@
                 </a:solidFill>
                 <a:latin typeface="Menlo" panose="020B0609030804020204" pitchFamily="49" charset="0"/>
               </a:rPr>
-              <a:t>)</a:t>
+              <a:t>(</a:t>
+            </a:r>
+            <a:r>
+              <a:rPr lang="en-US" sz="1800" dirty="0">
+                <a:solidFill>
+                  <a:srgbClr val="9C5D27"/>
+                </a:solidFill>
+                <a:latin typeface="Menlo" panose="020B0609030804020204" pitchFamily="49" charset="0"/>
+              </a:rPr>
+              <a:t>Bind </a:t>
+            </a:r>
+            <a:r>
+              <a:rPr lang="en-US" sz="1800" dirty="0">
+                <a:solidFill>
+                  <a:srgbClr val="333333"/>
+                </a:solidFill>
+                <a:latin typeface="Menlo" panose="020B0609030804020204" pitchFamily="49" charset="0"/>
+              </a:rPr>
+              <a:t>b</a:t>
+            </a:r>
+            <a:r>
+              <a:rPr lang="en-US" sz="1800" dirty="0">
+                <a:solidFill>
+                  <a:srgbClr val="777777"/>
+                </a:solidFill>
+                <a:latin typeface="Menlo" panose="020B0609030804020204" pitchFamily="49" charset="0"/>
+              </a:rPr>
+              <a:t>))</a:t>
             </a:r>
             <a:r>
               <a:rPr lang="en-US" sz="1800" dirty="0">
@@ -19478,7 +19439,7 @@
                 </a:solidFill>
                 <a:latin typeface="Menlo" panose="020B0609030804020204" pitchFamily="49" charset="0"/>
               </a:rPr>
-              <a:t>do             </a:t>
+              <a:t>      </a:t>
             </a:r>
             <a:r>
               <a:rPr lang="en-US" sz="1800" dirty="0">
@@ -19511,84 +19472,25 @@
                 </a:solidFill>
                 <a:latin typeface="Menlo" panose="020B0609030804020204" pitchFamily="49" charset="0"/>
               </a:rPr>
-              <a:t>  x </a:t>
-            </a:r>
-            <a:r>
-              <a:rPr lang="en-US" sz="1800" dirty="0">
-                <a:solidFill>
-                  <a:srgbClr val="777777"/>
-                </a:solidFill>
-                <a:latin typeface="Menlo" panose="020B0609030804020204" pitchFamily="49" charset="0"/>
-              </a:rPr>
-              <a:t>&lt;-</a:t>
-            </a:r>
-            <a:r>
-              <a:rPr lang="en-US" sz="1800" dirty="0">
-                <a:solidFill>
-                  <a:srgbClr val="333333"/>
-                </a:solidFill>
-                <a:latin typeface="Menlo" panose="020B0609030804020204" pitchFamily="49" charset="0"/>
-              </a:rPr>
-              <a:t> fresh</a:t>
-            </a:r>
-          </a:p>
-          <a:p>
-            <a:pPr marL="0" indent="0">
-              <a:buNone/>
-            </a:pPr>
-            <a:r>
-              <a:rPr lang="en-US" sz="1800" dirty="0">
-                <a:solidFill>
-                  <a:srgbClr val="333333"/>
-                </a:solidFill>
-                <a:latin typeface="Menlo" panose="020B0609030804020204" pitchFamily="49" charset="0"/>
-              </a:rPr>
-              <a:t>  b' </a:t>
-            </a:r>
-            <a:r>
-              <a:rPr lang="en-US" sz="1800" dirty="0">
-                <a:solidFill>
-                  <a:srgbClr val="777777"/>
-                </a:solidFill>
-                <a:latin typeface="Menlo" panose="020B0609030804020204" pitchFamily="49" charset="0"/>
-              </a:rPr>
-              <a:t>&lt;-</a:t>
-            </a:r>
-            <a:r>
-              <a:rPr lang="en-US" sz="1800" dirty="0">
-                <a:solidFill>
-                  <a:srgbClr val="333333"/>
-                </a:solidFill>
-                <a:latin typeface="Menlo" panose="020B0609030804020204" pitchFamily="49" charset="0"/>
-              </a:rPr>
-              <a:t> </a:t>
-            </a:r>
-            <a:r>
-              <a:rPr lang="en-US" sz="1800" dirty="0" err="1">
-                <a:solidFill>
-                  <a:srgbClr val="333333"/>
-                </a:solidFill>
-                <a:latin typeface="Menlo" panose="020B0609030804020204" pitchFamily="49" charset="0"/>
-              </a:rPr>
-              <a:t>nf</a:t>
-            </a:r>
-            <a:r>
-              <a:rPr lang="en-US" sz="1800" dirty="0">
-                <a:solidFill>
-                  <a:srgbClr val="333333"/>
-                </a:solidFill>
-                <a:latin typeface="Menlo" panose="020B0609030804020204" pitchFamily="49" charset="0"/>
-              </a:rPr>
-              <a:t> </a:t>
-            </a:r>
-            <a:r>
-              <a:rPr lang="en-US" sz="1800" dirty="0">
-                <a:solidFill>
-                  <a:srgbClr val="777777"/>
-                </a:solidFill>
-                <a:latin typeface="Menlo" panose="020B0609030804020204" pitchFamily="49" charset="0"/>
-              </a:rPr>
-              <a:t>(</a:t>
+              <a:t>  </a:t>
+            </a:r>
+            <a:r>
+              <a:rPr lang="en-US" sz="1800" dirty="0">
+                <a:solidFill>
+                  <a:srgbClr val="4B69C6"/>
+                </a:solidFill>
+                <a:latin typeface="Menlo" panose="020B0609030804020204" pitchFamily="49" charset="0"/>
+              </a:rPr>
+              <a:t>let</a:t>
+            </a:r>
+            <a:r>
+              <a:rPr lang="en-US" sz="1800" dirty="0">
+                <a:solidFill>
+                  <a:srgbClr val="333333"/>
+                </a:solidFill>
+                <a:latin typeface="Menlo" panose="020B0609030804020204" pitchFamily="49" charset="0"/>
+              </a:rPr>
+              <a:t> x  = </a:t>
             </a:r>
             <a:r>
               <a:rPr lang="en-US" sz="1800" b="1" dirty="0">
@@ -19597,52 +19499,16 @@
                 </a:solidFill>
                 <a:latin typeface="Menlo" panose="020B0609030804020204" pitchFamily="49" charset="0"/>
               </a:rPr>
-              <a:t>open</a:t>
-            </a:r>
-            <a:r>
-              <a:rPr lang="en-US" sz="1800" dirty="0">
-                <a:solidFill>
-                  <a:srgbClr val="333333"/>
-                </a:solidFill>
-                <a:latin typeface="Menlo" panose="020B0609030804020204" pitchFamily="49" charset="0"/>
-              </a:rPr>
-              <a:t> b </a:t>
-            </a:r>
-            <a:r>
-              <a:rPr lang="en-US" sz="1800" dirty="0">
-                <a:solidFill>
-                  <a:srgbClr val="777777"/>
-                </a:solidFill>
-                <a:latin typeface="Menlo" panose="020B0609030804020204" pitchFamily="49" charset="0"/>
-              </a:rPr>
-              <a:t>(</a:t>
-            </a:r>
-            <a:r>
-              <a:rPr lang="en-US" sz="1800" dirty="0">
-                <a:solidFill>
-                  <a:srgbClr val="9C5D27"/>
-                </a:solidFill>
-                <a:latin typeface="Menlo" panose="020B0609030804020204" pitchFamily="49" charset="0"/>
-              </a:rPr>
-              <a:t>Var</a:t>
-            </a:r>
-            <a:r>
-              <a:rPr lang="en-US" sz="1800" dirty="0">
-                <a:solidFill>
-                  <a:srgbClr val="333333"/>
-                </a:solidFill>
-                <a:latin typeface="Menlo" panose="020B0609030804020204" pitchFamily="49" charset="0"/>
-              </a:rPr>
-              <a:t> x</a:t>
-            </a:r>
-            <a:r>
-              <a:rPr lang="en-US" sz="1800" dirty="0">
-                <a:solidFill>
-                  <a:srgbClr val="777777"/>
-                </a:solidFill>
-                <a:latin typeface="Menlo" panose="020B0609030804020204" pitchFamily="49" charset="0"/>
-              </a:rPr>
-              <a:t>)) </a:t>
+              <a:t>fresh</a:t>
+            </a:r>
+            <a:r>
+              <a:rPr lang="en-US" sz="1800" dirty="0">
+                <a:solidFill>
+                  <a:srgbClr val="333333"/>
+                </a:solidFill>
+                <a:latin typeface="Menlo" panose="020B0609030804020204" pitchFamily="49" charset="0"/>
+              </a:rPr>
+              <a:t> b        </a:t>
             </a:r>
             <a:r>
               <a:rPr lang="en-US" sz="1800" dirty="0">
@@ -19655,7 +19521,7 @@
                 <a:ea typeface="Menlo" panose="020B0609030804020204" pitchFamily="49" charset="0"/>
                 <a:cs typeface="Menlo" panose="020B0609030804020204" pitchFamily="49" charset="0"/>
               </a:rPr>
-              <a:t>-- open: convert index to name</a:t>
+              <a:t>-- find var not free in b</a:t>
             </a:r>
             <a:endParaRPr lang="en-US" sz="1800" dirty="0">
               <a:solidFill>
@@ -19675,7 +19541,70 @@
                 </a:solidFill>
                 <a:latin typeface="Menlo" panose="020B0609030804020204" pitchFamily="49" charset="0"/>
               </a:rPr>
-              <a:t>  </a:t>
+              <a:t>      b' = </a:t>
+            </a:r>
+            <a:r>
+              <a:rPr lang="en-US" sz="1800" dirty="0" err="1">
+                <a:solidFill>
+                  <a:srgbClr val="333333"/>
+                </a:solidFill>
+                <a:latin typeface="Menlo" panose="020B0609030804020204" pitchFamily="49" charset="0"/>
+              </a:rPr>
+              <a:t>nf</a:t>
+            </a:r>
+            <a:r>
+              <a:rPr lang="en-US" sz="1800" dirty="0">
+                <a:solidFill>
+                  <a:srgbClr val="333333"/>
+                </a:solidFill>
+                <a:latin typeface="Menlo" panose="020B0609030804020204" pitchFamily="49" charset="0"/>
+              </a:rPr>
+              <a:t> </a:t>
+            </a:r>
+            <a:r>
+              <a:rPr lang="en-US" sz="1800" dirty="0">
+                <a:solidFill>
+                  <a:srgbClr val="777777"/>
+                </a:solidFill>
+                <a:latin typeface="Menlo" panose="020B0609030804020204" pitchFamily="49" charset="0"/>
+              </a:rPr>
+              <a:t>(</a:t>
+            </a:r>
+            <a:r>
+              <a:rPr lang="en-US" sz="1800" b="1" dirty="0" err="1">
+                <a:solidFill>
+                  <a:srgbClr val="333333"/>
+                </a:solidFill>
+                <a:latin typeface="Menlo" panose="020B0609030804020204" pitchFamily="49" charset="0"/>
+              </a:rPr>
+              <a:t>subst</a:t>
+            </a:r>
+            <a:r>
+              <a:rPr lang="en-US" sz="1800" b="1" dirty="0">
+                <a:solidFill>
+                  <a:srgbClr val="333333"/>
+                </a:solidFill>
+                <a:latin typeface="Menlo" panose="020B0609030804020204" pitchFamily="49" charset="0"/>
+              </a:rPr>
+              <a:t> </a:t>
+            </a:r>
+            <a:r>
+              <a:rPr lang="en-US" sz="1800" dirty="0">
+                <a:solidFill>
+                  <a:srgbClr val="333333"/>
+                </a:solidFill>
+                <a:latin typeface="Menlo" panose="020B0609030804020204" pitchFamily="49" charset="0"/>
+              </a:rPr>
+              <a:t>0 </a:t>
+            </a:r>
+            <a:r>
+              <a:rPr lang="en-US" sz="1800" dirty="0">
+                <a:solidFill>
+                  <a:srgbClr val="777777"/>
+                </a:solidFill>
+                <a:latin typeface="Menlo" panose="020B0609030804020204" pitchFamily="49" charset="0"/>
+              </a:rPr>
+              <a:t>(</a:t>
             </a:r>
             <a:r>
               <a:rPr lang="en-US" sz="1800" dirty="0">
@@ -19684,16 +19613,16 @@
                 </a:solidFill>
                 <a:latin typeface="Menlo" panose="020B0609030804020204" pitchFamily="49" charset="0"/>
               </a:rPr>
-              <a:t>Lam</a:t>
-            </a:r>
-            <a:r>
-              <a:rPr lang="en-US" sz="1800" dirty="0">
-                <a:solidFill>
-                  <a:srgbClr val="333333"/>
-                </a:solidFill>
-                <a:latin typeface="Menlo" panose="020B0609030804020204" pitchFamily="49" charset="0"/>
-              </a:rPr>
-              <a:t> </a:t>
+              <a:t>Var</a:t>
+            </a:r>
+            <a:r>
+              <a:rPr lang="en-US" sz="1800" dirty="0">
+                <a:solidFill>
+                  <a:srgbClr val="333333"/>
+                </a:solidFill>
+                <a:latin typeface="Menlo" panose="020B0609030804020204" pitchFamily="49" charset="0"/>
+              </a:rPr>
+              <a:t> x</a:t>
             </a:r>
             <a:r>
               <a:rPr lang="en-US" sz="1800" dirty="0">
@@ -19702,25 +19631,13 @@
                 </a:solidFill>
                 <a:latin typeface="Menlo" panose="020B0609030804020204" pitchFamily="49" charset="0"/>
               </a:rPr>
-              <a:t>&lt;$&gt; </a:t>
-            </a:r>
-            <a:r>
-              <a:rPr lang="en-US" sz="1800" b="1" dirty="0">
-                <a:solidFill>
-                  <a:srgbClr val="333333"/>
-                </a:solidFill>
-                <a:latin typeface="Menlo" panose="020B0609030804020204" pitchFamily="49" charset="0"/>
-              </a:rPr>
-              <a:t>close</a:t>
-            </a:r>
-            <a:r>
-              <a:rPr lang="en-US" sz="1800" dirty="0">
-                <a:solidFill>
-                  <a:srgbClr val="333333"/>
-                </a:solidFill>
-                <a:latin typeface="Menlo" panose="020B0609030804020204" pitchFamily="49" charset="0"/>
-              </a:rPr>
-              <a:t> x b'</a:t>
+              <a:t>) </a:t>
+            </a:r>
+            <a:r>
+              <a:rPr lang="en-US" sz="1800" dirty="0">
+                <a:latin typeface="Menlo" panose="020B0609030804020204" pitchFamily="49" charset="0"/>
+              </a:rPr>
+              <a:t>b</a:t>
             </a:r>
             <a:r>
               <a:rPr lang="en-US" sz="1800" dirty="0">
@@ -19729,7 +19646,7 @@
                 </a:solidFill>
                 <a:latin typeface="Menlo" panose="020B0609030804020204" pitchFamily="49" charset="0"/>
               </a:rPr>
-              <a:t>        </a:t>
+              <a:t>) </a:t>
             </a:r>
             <a:r>
               <a:rPr lang="en-US" sz="1800" dirty="0">
@@ -19742,7 +19659,7 @@
                 <a:ea typeface="Menlo" panose="020B0609030804020204" pitchFamily="49" charset="0"/>
                 <a:cs typeface="Menlo" panose="020B0609030804020204" pitchFamily="49" charset="0"/>
               </a:rPr>
-              <a:t>-- close: convert name to index</a:t>
+              <a:t>-- index to name</a:t>
             </a:r>
             <a:endParaRPr lang="en-US" sz="1800" dirty="0">
               <a:solidFill>
@@ -19756,13 +19673,22 @@
               <a:buNone/>
             </a:pPr>
             <a:r>
-              <a:rPr lang="en-US" sz="1800" dirty="0" err="1">
-                <a:solidFill>
-                  <a:srgbClr val="333333"/>
-                </a:solidFill>
-                <a:latin typeface="Menlo" panose="020B0609030804020204" pitchFamily="49" charset="0"/>
-              </a:rPr>
-              <a:t>nf</a:t>
+              <a:rPr lang="en-US" sz="1800" dirty="0">
+                <a:solidFill>
+                  <a:srgbClr val="333333"/>
+                </a:solidFill>
+                <a:latin typeface="Menlo" panose="020B0609030804020204" pitchFamily="49" charset="0"/>
+              </a:rPr>
+              <a:t>  </a:t>
+            </a:r>
+            <a:r>
+              <a:rPr lang="en-US" sz="1800" dirty="0">
+                <a:solidFill>
+                  <a:srgbClr val="4B69C6"/>
+                </a:solidFill>
+                <a:latin typeface="Menlo" panose="020B0609030804020204" pitchFamily="49" charset="0"/>
+              </a:rPr>
+              <a:t>in</a:t>
             </a:r>
             <a:r>
               <a:rPr lang="en-US" sz="1800" dirty="0">
@@ -19776,6 +19702,24 @@
             <a:r>
               <a:rPr lang="en-US" sz="1800" dirty="0">
                 <a:solidFill>
+                  <a:srgbClr val="9C5D27"/>
+                </a:solidFill>
+                <a:latin typeface="Menlo" panose="020B0609030804020204" pitchFamily="49" charset="0"/>
+              </a:rPr>
+              <a:t>Lam</a:t>
+            </a:r>
+            <a:r>
+              <a:rPr lang="en-US" sz="1800" dirty="0">
+                <a:solidFill>
+                  <a:srgbClr val="333333"/>
+                </a:solidFill>
+                <a:latin typeface="Menlo" panose="020B0609030804020204" pitchFamily="49" charset="0"/>
+              </a:rPr>
+              <a:t> </a:t>
+            </a:r>
+            <a:r>
+              <a:rPr lang="en-US" sz="1800" dirty="0">
+                <a:solidFill>
                   <a:srgbClr val="777777"/>
                 </a:solidFill>
                 <a:latin typeface="Menlo" panose="020B0609030804020204" pitchFamily="49" charset="0"/>
@@ -19789,16 +19733,7 @@
                 </a:solidFill>
                 <a:latin typeface="Menlo" panose="020B0609030804020204" pitchFamily="49" charset="0"/>
               </a:rPr>
-              <a:t>App</a:t>
-            </a:r>
-            <a:r>
-              <a:rPr lang="en-US" sz="1800" dirty="0">
-                <a:solidFill>
-                  <a:srgbClr val="333333"/>
-                </a:solidFill>
-                <a:latin typeface="Menlo" panose="020B0609030804020204" pitchFamily="49" charset="0"/>
-              </a:rPr>
-              <a:t> a b</a:t>
+              <a:t>Bind </a:t>
             </a:r>
             <a:r>
               <a:rPr lang="en-US" sz="1800" dirty="0">
@@ -19807,16 +19742,25 @@
                 </a:solidFill>
                 <a:latin typeface="Menlo" panose="020B0609030804020204" pitchFamily="49" charset="0"/>
               </a:rPr>
-              <a:t>)</a:t>
-            </a:r>
-            <a:r>
-              <a:rPr lang="en-US" sz="1800" dirty="0">
-                <a:solidFill>
-                  <a:srgbClr val="333333"/>
-                </a:solidFill>
-                <a:latin typeface="Menlo" panose="020B0609030804020204" pitchFamily="49" charset="0"/>
-              </a:rPr>
-              <a:t> </a:t>
+              <a:t>(</a:t>
+            </a:r>
+            <a:r>
+              <a:rPr lang="en-US" sz="1800" b="1" dirty="0">
+                <a:solidFill>
+                  <a:srgbClr val="333333"/>
+                </a:solidFill>
+                <a:latin typeface="Menlo" panose="020B0609030804020204" pitchFamily="49" charset="0"/>
+              </a:rPr>
+              <a:t>close</a:t>
+            </a:r>
+            <a:r>
+              <a:rPr lang="en-US" sz="1800" dirty="0">
+                <a:solidFill>
+                  <a:srgbClr val="333333"/>
+                </a:solidFill>
+                <a:latin typeface="Menlo" panose="020B0609030804020204" pitchFamily="49" charset="0"/>
+              </a:rPr>
+              <a:t> x b'</a:t>
             </a:r>
             <a:r>
               <a:rPr lang="en-US" sz="1800" dirty="0">
@@ -19825,25 +19769,20 @@
                 </a:solidFill>
                 <a:latin typeface="Menlo" panose="020B0609030804020204" pitchFamily="49" charset="0"/>
               </a:rPr>
-              <a:t>=</a:t>
-            </a:r>
-            <a:r>
-              <a:rPr lang="en-US" sz="1800" dirty="0">
-                <a:solidFill>
-                  <a:srgbClr val="333333"/>
-                </a:solidFill>
-                <a:latin typeface="Menlo" panose="020B0609030804020204" pitchFamily="49" charset="0"/>
-              </a:rPr>
-              <a:t> </a:t>
-            </a:r>
-            <a:r>
-              <a:rPr lang="en-US" sz="1800" dirty="0">
-                <a:solidFill>
-                  <a:srgbClr val="4B69C6"/>
-                </a:solidFill>
-                <a:latin typeface="Menlo" panose="020B0609030804020204" pitchFamily="49" charset="0"/>
-              </a:rPr>
-              <a:t>do</a:t>
+              <a:t>))      </a:t>
+            </a:r>
+            <a:r>
+              <a:rPr lang="en-US" sz="1800" dirty="0">
+                <a:solidFill>
+                  <a:schemeClr val="bg2">
+                    <a:lumMod val="50000"/>
+                  </a:schemeClr>
+                </a:solidFill>
+                <a:latin typeface="Menlo" panose="020B0609030804020204" pitchFamily="49" charset="0"/>
+                <a:ea typeface="Menlo" panose="020B0609030804020204" pitchFamily="49" charset="0"/>
+                <a:cs typeface="Menlo" panose="020B0609030804020204" pitchFamily="49" charset="0"/>
+              </a:rPr>
+              <a:t>-- name to index</a:t>
             </a:r>
             <a:endParaRPr lang="en-US" sz="1800" dirty="0">
               <a:solidFill>
@@ -19857,13 +19796,22 @@
               <a:buNone/>
             </a:pPr>
             <a:r>
-              <a:rPr lang="en-US" sz="1800" dirty="0">
-                <a:solidFill>
-                  <a:srgbClr val="333333"/>
-                </a:solidFill>
-                <a:latin typeface="Menlo" panose="020B0609030804020204" pitchFamily="49" charset="0"/>
-              </a:rPr>
-              <a:t>  a' </a:t>
+              <a:rPr lang="en-US" sz="1800" dirty="0" err="1">
+                <a:solidFill>
+                  <a:srgbClr val="333333"/>
+                </a:solidFill>
+                <a:latin typeface="Menlo" panose="020B0609030804020204" pitchFamily="49" charset="0"/>
+              </a:rPr>
+              <a:t>nf</a:t>
+            </a:r>
+            <a:r>
+              <a:rPr lang="en-US" sz="1800" dirty="0">
+                <a:solidFill>
+                  <a:srgbClr val="333333"/>
+                </a:solidFill>
+                <a:latin typeface="Menlo" panose="020B0609030804020204" pitchFamily="49" charset="0"/>
+              </a:rPr>
+              <a:t> </a:t>
             </a:r>
             <a:r>
               <a:rPr lang="en-US" sz="1800" dirty="0">
@@ -19872,7 +19820,34 @@
                 </a:solidFill>
                 <a:latin typeface="Menlo" panose="020B0609030804020204" pitchFamily="49" charset="0"/>
               </a:rPr>
-              <a:t>&lt;-</a:t>
+              <a:t>(</a:t>
+            </a:r>
+            <a:r>
+              <a:rPr lang="en-US" sz="1800" dirty="0">
+                <a:solidFill>
+                  <a:srgbClr val="9C5D27"/>
+                </a:solidFill>
+                <a:latin typeface="Menlo" panose="020B0609030804020204" pitchFamily="49" charset="0"/>
+              </a:rPr>
+              <a:t>App</a:t>
+            </a:r>
+            <a:r>
+              <a:rPr lang="en-US" sz="1800" dirty="0">
+                <a:solidFill>
+                  <a:srgbClr val="333333"/>
+                </a:solidFill>
+                <a:latin typeface="Menlo" panose="020B0609030804020204" pitchFamily="49" charset="0"/>
+              </a:rPr>
+              <a:t> a b</a:t>
+            </a:r>
+            <a:r>
+              <a:rPr lang="en-US" sz="1800" dirty="0">
+                <a:solidFill>
+                  <a:srgbClr val="777777"/>
+                </a:solidFill>
+                <a:latin typeface="Menlo" panose="020B0609030804020204" pitchFamily="49" charset="0"/>
+              </a:rPr>
+              <a:t>)</a:t>
             </a:r>
             <a:r>
               <a:rPr lang="en-US" sz="1800" dirty="0">
@@ -19884,54 +19859,13 @@
               <a:t> </a:t>
             </a:r>
             <a:r>
-              <a:rPr lang="en-US" sz="1800" dirty="0" err="1">
-                <a:solidFill>
-                  <a:srgbClr val="333333"/>
-                </a:solidFill>
-                <a:latin typeface="Menlo" panose="020B0609030804020204" pitchFamily="49" charset="0"/>
-              </a:rPr>
-              <a:t>whnf</a:t>
-            </a:r>
-            <a:r>
-              <a:rPr lang="en-US" sz="1800" dirty="0">
-                <a:solidFill>
-                  <a:srgbClr val="333333"/>
-                </a:solidFill>
-                <a:latin typeface="Menlo" panose="020B0609030804020204" pitchFamily="49" charset="0"/>
-              </a:rPr>
-              <a:t> a</a:t>
-            </a:r>
-          </a:p>
-          <a:p>
-            <a:pPr marL="0" indent="0">
-              <a:buNone/>
-            </a:pPr>
-            <a:r>
-              <a:rPr lang="en-US" sz="1800" dirty="0">
-                <a:solidFill>
-                  <a:srgbClr val="4B69C6"/>
-                </a:solidFill>
-                <a:latin typeface="Menlo" panose="020B0609030804020204" pitchFamily="49" charset="0"/>
-              </a:rPr>
-              <a:t>  case</a:t>
-            </a:r>
-            <a:r>
-              <a:rPr lang="en-US" sz="1800" dirty="0">
-                <a:solidFill>
-                  <a:srgbClr val="333333"/>
-                </a:solidFill>
-                <a:latin typeface="Menlo" panose="020B0609030804020204" pitchFamily="49" charset="0"/>
-              </a:rPr>
-              <a:t> a' </a:t>
-            </a:r>
-            <a:r>
-              <a:rPr lang="en-US" sz="1800" dirty="0">
-                <a:solidFill>
-                  <a:srgbClr val="4B69C6"/>
-                </a:solidFill>
-                <a:latin typeface="Menlo" panose="020B0609030804020204" pitchFamily="49" charset="0"/>
-              </a:rPr>
-              <a:t>of</a:t>
+              <a:rPr lang="en-US" sz="1800" dirty="0">
+                <a:solidFill>
+                  <a:srgbClr val="777777"/>
+                </a:solidFill>
+                <a:latin typeface="Menlo" panose="020B0609030804020204" pitchFamily="49" charset="0"/>
+              </a:rPr>
+              <a:t>=</a:t>
             </a:r>
             <a:endParaRPr lang="en-US" sz="1800" dirty="0">
               <a:solidFill>
@@ -19947,29 +19881,11 @@
             <a:r>
               <a:rPr lang="en-US" sz="1800" dirty="0">
                 <a:solidFill>
-                  <a:srgbClr val="9C5D27"/>
-                </a:solidFill>
-                <a:latin typeface="Menlo" panose="020B0609030804020204" pitchFamily="49" charset="0"/>
-              </a:rPr>
-              <a:t>    Lam</a:t>
-            </a:r>
-            <a:r>
-              <a:rPr lang="en-US" sz="1800" dirty="0">
-                <a:solidFill>
-                  <a:srgbClr val="333333"/>
-                </a:solidFill>
-                <a:latin typeface="Menlo" panose="020B0609030804020204" pitchFamily="49" charset="0"/>
-              </a:rPr>
-              <a:t> a0 </a:t>
-            </a:r>
-            <a:r>
-              <a:rPr lang="en-US" sz="1800" dirty="0">
-                <a:solidFill>
-                  <a:srgbClr val="777777"/>
-                </a:solidFill>
-                <a:latin typeface="Menlo" panose="020B0609030804020204" pitchFamily="49" charset="0"/>
-              </a:rPr>
-              <a:t>-&gt;</a:t>
+                  <a:srgbClr val="4B69C6"/>
+                </a:solidFill>
+                <a:latin typeface="Menlo" panose="020B0609030804020204" pitchFamily="49" charset="0"/>
+              </a:rPr>
+              <a:t>  case</a:t>
             </a:r>
             <a:r>
               <a:rPr lang="en-US" sz="1800" dirty="0">
@@ -19987,65 +19903,25 @@
                 </a:solidFill>
                 <a:latin typeface="Menlo" panose="020B0609030804020204" pitchFamily="49" charset="0"/>
               </a:rPr>
-              <a:t>nf</a:t>
-            </a:r>
-            <a:r>
-              <a:rPr lang="en-US" sz="1800" dirty="0">
-                <a:solidFill>
-                  <a:srgbClr val="333333"/>
-                </a:solidFill>
-                <a:latin typeface="Menlo" panose="020B0609030804020204" pitchFamily="49" charset="0"/>
-              </a:rPr>
-              <a:t> </a:t>
-            </a:r>
-            <a:r>
-              <a:rPr lang="en-US" sz="1800" dirty="0">
-                <a:solidFill>
-                  <a:srgbClr val="777777"/>
-                </a:solidFill>
-                <a:latin typeface="Menlo" panose="020B0609030804020204" pitchFamily="49" charset="0"/>
-              </a:rPr>
-              <a:t>(</a:t>
-            </a:r>
-            <a:r>
-              <a:rPr lang="en-US" sz="1800" b="1" dirty="0">
-                <a:solidFill>
-                  <a:srgbClr val="333333"/>
-                </a:solidFill>
-                <a:latin typeface="Menlo" panose="020B0609030804020204" pitchFamily="49" charset="0"/>
-              </a:rPr>
-              <a:t>open</a:t>
-            </a:r>
-            <a:r>
-              <a:rPr lang="en-US" sz="1800" dirty="0">
-                <a:solidFill>
-                  <a:srgbClr val="333333"/>
-                </a:solidFill>
-                <a:latin typeface="Menlo" panose="020B0609030804020204" pitchFamily="49" charset="0"/>
-              </a:rPr>
-              <a:t> a0 b</a:t>
-            </a:r>
-            <a:r>
-              <a:rPr lang="en-US" sz="1800" dirty="0">
-                <a:solidFill>
-                  <a:srgbClr val="777777"/>
-                </a:solidFill>
-                <a:latin typeface="Menlo" panose="020B0609030804020204" pitchFamily="49" charset="0"/>
-              </a:rPr>
-              <a:t>)  </a:t>
-            </a:r>
-            <a:r>
-              <a:rPr lang="en-US" sz="1800" dirty="0">
-                <a:solidFill>
-                  <a:schemeClr val="bg2">
-                    <a:lumMod val="50000"/>
-                  </a:schemeClr>
-                </a:solidFill>
-                <a:latin typeface="Menlo" panose="020B0609030804020204" pitchFamily="49" charset="0"/>
-                <a:ea typeface="Menlo" panose="020B0609030804020204" pitchFamily="49" charset="0"/>
-                <a:cs typeface="Menlo" panose="020B0609030804020204" pitchFamily="49" charset="0"/>
-              </a:rPr>
-              <a:t>-- open is substitution</a:t>
+              <a:t>whnf</a:t>
+            </a:r>
+            <a:r>
+              <a:rPr lang="en-US" sz="1800" dirty="0">
+                <a:solidFill>
+                  <a:srgbClr val="333333"/>
+                </a:solidFill>
+                <a:latin typeface="Menlo" panose="020B0609030804020204" pitchFamily="49" charset="0"/>
+              </a:rPr>
+              <a:t> a </a:t>
+            </a:r>
+            <a:r>
+              <a:rPr lang="en-US" sz="1800" dirty="0">
+                <a:solidFill>
+                  <a:srgbClr val="4B69C6"/>
+                </a:solidFill>
+                <a:latin typeface="Menlo" panose="020B0609030804020204" pitchFamily="49" charset="0"/>
+              </a:rPr>
+              <a:t>of</a:t>
             </a:r>
             <a:endParaRPr lang="en-US" sz="1800" dirty="0">
               <a:solidFill>
@@ -20061,11 +19937,20 @@
             <a:r>
               <a:rPr lang="en-US" sz="1800" dirty="0">
                 <a:solidFill>
-                  <a:srgbClr val="333333"/>
-                </a:solidFill>
-                <a:latin typeface="Menlo" panose="020B0609030804020204" pitchFamily="49" charset="0"/>
-              </a:rPr>
-              <a:t>    _ </a:t>
+                  <a:srgbClr val="9C5D27"/>
+                </a:solidFill>
+                <a:latin typeface="Menlo" panose="020B0609030804020204" pitchFamily="49" charset="0"/>
+              </a:rPr>
+              <a:t>    Lam</a:t>
+            </a:r>
+            <a:r>
+              <a:rPr lang="en-US" sz="1800" dirty="0">
+                <a:solidFill>
+                  <a:srgbClr val="333333"/>
+                </a:solidFill>
+                <a:latin typeface="Menlo" panose="020B0609030804020204" pitchFamily="49" charset="0"/>
+              </a:rPr>
+              <a:t> </a:t>
             </a:r>
             <a:r>
               <a:rPr lang="en-US" sz="1800" dirty="0">
@@ -20074,6 +19959,51 @@
                 </a:solidFill>
                 <a:latin typeface="Menlo" panose="020B0609030804020204" pitchFamily="49" charset="0"/>
               </a:rPr>
+              <a:t>(</a:t>
+            </a:r>
+            <a:r>
+              <a:rPr lang="en-US" sz="1800" dirty="0">
+                <a:solidFill>
+                  <a:srgbClr val="9C5D27"/>
+                </a:solidFill>
+                <a:latin typeface="Menlo" panose="020B0609030804020204" pitchFamily="49" charset="0"/>
+              </a:rPr>
+              <a:t>Bind </a:t>
+            </a:r>
+            <a:r>
+              <a:rPr lang="en-US" sz="1800" dirty="0">
+                <a:solidFill>
+                  <a:srgbClr val="333333"/>
+                </a:solidFill>
+                <a:latin typeface="Menlo" panose="020B0609030804020204" pitchFamily="49" charset="0"/>
+              </a:rPr>
+              <a:t>a0</a:t>
+            </a:r>
+            <a:r>
+              <a:rPr lang="en-US" sz="1800" dirty="0">
+                <a:solidFill>
+                  <a:srgbClr val="777777"/>
+                </a:solidFill>
+                <a:latin typeface="Menlo" panose="020B0609030804020204" pitchFamily="49" charset="0"/>
+              </a:rPr>
+              <a:t>)</a:t>
+            </a:r>
+            <a:r>
+              <a:rPr lang="en-US" sz="1800" dirty="0">
+                <a:solidFill>
+                  <a:srgbClr val="333333"/>
+                </a:solidFill>
+                <a:latin typeface="Menlo" panose="020B0609030804020204" pitchFamily="49" charset="0"/>
+              </a:rPr>
+              <a:t> </a:t>
+            </a:r>
+            <a:r>
+              <a:rPr lang="en-US" sz="1800" dirty="0">
+                <a:solidFill>
+                  <a:srgbClr val="777777"/>
+                </a:solidFill>
+                <a:latin typeface="Menlo" panose="020B0609030804020204" pitchFamily="49" charset="0"/>
+              </a:rPr>
               <a:t>-&gt;</a:t>
             </a:r>
             <a:r>
@@ -20085,6 +20015,134 @@
               </a:rPr>
               <a:t> </a:t>
             </a:r>
+          </a:p>
+          <a:p>
+            <a:pPr marL="0" indent="0">
+              <a:buNone/>
+            </a:pPr>
+            <a:r>
+              <a:rPr lang="en-US" sz="1800" dirty="0">
+                <a:solidFill>
+                  <a:srgbClr val="333333"/>
+                </a:solidFill>
+                <a:latin typeface="Menlo" panose="020B0609030804020204" pitchFamily="49" charset="0"/>
+              </a:rPr>
+              <a:t>      </a:t>
+            </a:r>
+            <a:r>
+              <a:rPr lang="en-US" sz="1800" dirty="0" err="1">
+                <a:solidFill>
+                  <a:srgbClr val="333333"/>
+                </a:solidFill>
+                <a:latin typeface="Menlo" panose="020B0609030804020204" pitchFamily="49" charset="0"/>
+              </a:rPr>
+              <a:t>nf</a:t>
+            </a:r>
+            <a:r>
+              <a:rPr lang="en-US" sz="1800" dirty="0">
+                <a:solidFill>
+                  <a:srgbClr val="333333"/>
+                </a:solidFill>
+                <a:latin typeface="Menlo" panose="020B0609030804020204" pitchFamily="49" charset="0"/>
+              </a:rPr>
+              <a:t> </a:t>
+            </a:r>
+            <a:r>
+              <a:rPr lang="en-US" sz="1800" dirty="0">
+                <a:solidFill>
+                  <a:srgbClr val="777777"/>
+                </a:solidFill>
+                <a:latin typeface="Menlo" panose="020B0609030804020204" pitchFamily="49" charset="0"/>
+              </a:rPr>
+              <a:t>(</a:t>
+            </a:r>
+            <a:r>
+              <a:rPr lang="en-US" sz="1800" b="1" dirty="0" err="1">
+                <a:solidFill>
+                  <a:srgbClr val="333333"/>
+                </a:solidFill>
+                <a:latin typeface="Menlo" panose="020B0609030804020204" pitchFamily="49" charset="0"/>
+              </a:rPr>
+              <a:t>subst</a:t>
+            </a:r>
+            <a:r>
+              <a:rPr lang="en-US" sz="1800" b="1" dirty="0">
+                <a:solidFill>
+                  <a:srgbClr val="333333"/>
+                </a:solidFill>
+                <a:latin typeface="Menlo" panose="020B0609030804020204" pitchFamily="49" charset="0"/>
+              </a:rPr>
+              <a:t> </a:t>
+            </a:r>
+            <a:r>
+              <a:rPr lang="en-US" sz="1800" dirty="0">
+                <a:solidFill>
+                  <a:srgbClr val="333333"/>
+                </a:solidFill>
+                <a:latin typeface="Menlo" panose="020B0609030804020204" pitchFamily="49" charset="0"/>
+              </a:rPr>
+              <a:t>0 b a0</a:t>
+            </a:r>
+            <a:r>
+              <a:rPr lang="en-US" sz="1800" dirty="0">
+                <a:solidFill>
+                  <a:srgbClr val="777777"/>
+                </a:solidFill>
+                <a:latin typeface="Menlo" panose="020B0609030804020204" pitchFamily="49" charset="0"/>
+              </a:rPr>
+              <a:t>)       </a:t>
+            </a:r>
+            <a:r>
+              <a:rPr lang="en-US" sz="1800" dirty="0">
+                <a:solidFill>
+                  <a:schemeClr val="bg2">
+                    <a:lumMod val="50000"/>
+                  </a:schemeClr>
+                </a:solidFill>
+                <a:latin typeface="Menlo" panose="020B0609030804020204" pitchFamily="49" charset="0"/>
+                <a:ea typeface="Menlo" panose="020B0609030804020204" pitchFamily="49" charset="0"/>
+                <a:cs typeface="Menlo" panose="020B0609030804020204" pitchFamily="49" charset="0"/>
+              </a:rPr>
+              <a:t>-- no index adj. from invariant</a:t>
+            </a:r>
+            <a:endParaRPr lang="en-US" sz="1800" dirty="0">
+              <a:solidFill>
+                <a:srgbClr val="333333"/>
+              </a:solidFill>
+              <a:latin typeface="Menlo" panose="020B0609030804020204" pitchFamily="49" charset="0"/>
+            </a:endParaRPr>
+          </a:p>
+          <a:p>
+            <a:pPr marL="0" indent="0">
+              <a:buNone/>
+            </a:pPr>
+            <a:r>
+              <a:rPr lang="en-US" sz="1800" dirty="0">
+                <a:solidFill>
+                  <a:srgbClr val="333333"/>
+                </a:solidFill>
+                <a:latin typeface="Menlo" panose="020B0609030804020204" pitchFamily="49" charset="0"/>
+              </a:rPr>
+              <a:t>    a' </a:t>
+            </a:r>
+            <a:r>
+              <a:rPr lang="en-US" sz="1800" dirty="0">
+                <a:solidFill>
+                  <a:srgbClr val="777777"/>
+                </a:solidFill>
+                <a:latin typeface="Menlo" panose="020B0609030804020204" pitchFamily="49" charset="0"/>
+              </a:rPr>
+              <a:t>-&gt;</a:t>
+            </a:r>
+            <a:r>
+              <a:rPr lang="en-US" sz="1800" dirty="0">
+                <a:solidFill>
+                  <a:srgbClr val="333333"/>
+                </a:solidFill>
+                <a:latin typeface="Menlo" panose="020B0609030804020204" pitchFamily="49" charset="0"/>
+              </a:rPr>
+              <a:t> </a:t>
+            </a:r>
             <a:r>
               <a:rPr lang="en-US" sz="1800" dirty="0">
                 <a:solidFill>
@@ -20110,16 +20168,7 @@
                 </a:solidFill>
                 <a:latin typeface="Menlo" panose="020B0609030804020204" pitchFamily="49" charset="0"/>
               </a:rPr>
-              <a:t>&lt;$&gt;</a:t>
-            </a:r>
-            <a:r>
-              <a:rPr lang="en-US" sz="1800" dirty="0">
-                <a:solidFill>
-                  <a:srgbClr val="333333"/>
-                </a:solidFill>
-                <a:latin typeface="Menlo" panose="020B0609030804020204" pitchFamily="49" charset="0"/>
-              </a:rPr>
-              <a:t> </a:t>
+              <a:t>(</a:t>
             </a:r>
             <a:r>
               <a:rPr lang="en-US" sz="1800" dirty="0" err="1">
@@ -20137,7 +20186,7 @@
                 </a:solidFill>
                 <a:latin typeface="Menlo" panose="020B0609030804020204" pitchFamily="49" charset="0"/>
               </a:rPr>
-              <a:t> a' </a:t>
+              <a:t> a'</a:t>
             </a:r>
             <a:r>
               <a:rPr lang="en-US" sz="1800" dirty="0">
@@ -20146,16 +20195,7 @@
                 </a:solidFill>
                 <a:latin typeface="Menlo" panose="020B0609030804020204" pitchFamily="49" charset="0"/>
               </a:rPr>
-              <a:t>&lt;*&gt;</a:t>
-            </a:r>
-            <a:r>
-              <a:rPr lang="en-US" sz="1800" dirty="0">
-                <a:solidFill>
-                  <a:srgbClr val="333333"/>
-                </a:solidFill>
-                <a:latin typeface="Menlo" panose="020B0609030804020204" pitchFamily="49" charset="0"/>
-              </a:rPr>
-              <a:t> </a:t>
+              <a:t>) (</a:t>
             </a:r>
             <a:r>
               <a:rPr lang="en-US" sz="1800" dirty="0" err="1">
@@ -20174,6 +20214,15 @@
                 <a:latin typeface="Menlo" panose="020B0609030804020204" pitchFamily="49" charset="0"/>
               </a:rPr>
               <a:t> b</a:t>
+            </a:r>
+            <a:r>
+              <a:rPr lang="en-US" sz="1800" dirty="0">
+                <a:solidFill>
+                  <a:srgbClr val="777777"/>
+                </a:solidFill>
+                <a:latin typeface="Menlo" panose="020B0609030804020204" pitchFamily="49" charset="0"/>
+              </a:rPr>
+              <a:t>)</a:t>
             </a:r>
           </a:p>
           <a:p>
@@ -20884,288 +20933,6 @@
           </a:p>
         </p:txBody>
       </p:sp>
-      <p:sp>
-        <p:nvSpPr>
-          <p:cNvPr id="4" name="Text Placeholder 2">
-            <a:extLst>
-              <a:ext uri="{FF2B5EF4-FFF2-40B4-BE49-F238E27FC236}">
-                <a16:creationId xmlns:a16="http://schemas.microsoft.com/office/drawing/2014/main" id="{2F535D92-45F1-8648-9871-9A3AC341B876}"/>
-              </a:ext>
-            </a:extLst>
-          </p:cNvPr>
-          <p:cNvSpPr txBox="1">
-            <a:spLocks/>
-          </p:cNvSpPr>
-          <p:nvPr/>
-        </p:nvSpPr>
-        <p:spPr>
-          <a:xfrm>
-            <a:off x="623888" y="3791375"/>
-            <a:ext cx="8138068" cy="1125140"/>
-          </a:xfrm>
-          <a:prstGeom prst="rect">
-            <a:avLst/>
-          </a:prstGeom>
-        </p:spPr>
-        <p:txBody>
-          <a:bodyPr vert="horz" lIns="91440" tIns="45720" rIns="91440" bIns="45720" rtlCol="0">
-            <a:normAutofit fontScale="92500" lnSpcReduction="20000"/>
-          </a:bodyPr>
-          <a:lstStyle>
-            <a:lvl1pPr marL="0" indent="0" algn="l" defTabSz="685800" rtl="0" eaLnBrk="1" latinLnBrk="0" hangingPunct="1">
-              <a:lnSpc>
-                <a:spcPct val="90000"/>
-              </a:lnSpc>
-              <a:spcBef>
-                <a:spcPts val="750"/>
-              </a:spcBef>
-              <a:buFont typeface="Arial" panose="020B0604020202020204" pitchFamily="34" charset="0"/>
-              <a:buNone/>
-              <a:defRPr sz="1800" kern="1200">
-                <a:solidFill>
-                  <a:schemeClr val="tx1">
-                    <a:tint val="75000"/>
-                  </a:schemeClr>
-                </a:solidFill>
-                <a:latin typeface="+mn-lt"/>
-                <a:ea typeface="+mn-ea"/>
-                <a:cs typeface="+mn-cs"/>
-              </a:defRPr>
-            </a:lvl1pPr>
-            <a:lvl2pPr marL="342900" indent="0" algn="l" defTabSz="685800" rtl="0" eaLnBrk="1" latinLnBrk="0" hangingPunct="1">
-              <a:lnSpc>
-                <a:spcPct val="90000"/>
-              </a:lnSpc>
-              <a:spcBef>
-                <a:spcPts val="375"/>
-              </a:spcBef>
-              <a:buFont typeface="Arial" panose="020B0604020202020204" pitchFamily="34" charset="0"/>
-              <a:buNone/>
-              <a:defRPr sz="1500" kern="1200">
-                <a:solidFill>
-                  <a:schemeClr val="tx1">
-                    <a:tint val="75000"/>
-                  </a:schemeClr>
-                </a:solidFill>
-                <a:latin typeface="+mn-lt"/>
-                <a:ea typeface="+mn-ea"/>
-                <a:cs typeface="+mn-cs"/>
-              </a:defRPr>
-            </a:lvl2pPr>
-            <a:lvl3pPr marL="685800" indent="0" algn="l" defTabSz="685800" rtl="0" eaLnBrk="1" latinLnBrk="0" hangingPunct="1">
-              <a:lnSpc>
-                <a:spcPct val="90000"/>
-              </a:lnSpc>
-              <a:spcBef>
-                <a:spcPts val="375"/>
-              </a:spcBef>
-              <a:buFont typeface="Arial" panose="020B0604020202020204" pitchFamily="34" charset="0"/>
-              <a:buNone/>
-              <a:defRPr sz="1350" kern="1200">
-                <a:solidFill>
-                  <a:schemeClr val="tx1">
-                    <a:tint val="75000"/>
-                  </a:schemeClr>
-                </a:solidFill>
-                <a:latin typeface="+mn-lt"/>
-                <a:ea typeface="+mn-ea"/>
-                <a:cs typeface="+mn-cs"/>
-              </a:defRPr>
-            </a:lvl3pPr>
-            <a:lvl4pPr marL="1028700" indent="0" algn="l" defTabSz="685800" rtl="0" eaLnBrk="1" latinLnBrk="0" hangingPunct="1">
-              <a:lnSpc>
-                <a:spcPct val="90000"/>
-              </a:lnSpc>
-              <a:spcBef>
-                <a:spcPts val="375"/>
-              </a:spcBef>
-              <a:buFont typeface="Arial" panose="020B0604020202020204" pitchFamily="34" charset="0"/>
-              <a:buNone/>
-              <a:defRPr sz="1200" kern="1200">
-                <a:solidFill>
-                  <a:schemeClr val="tx1">
-                    <a:tint val="75000"/>
-                  </a:schemeClr>
-                </a:solidFill>
-                <a:latin typeface="+mn-lt"/>
-                <a:ea typeface="+mn-ea"/>
-                <a:cs typeface="+mn-cs"/>
-              </a:defRPr>
-            </a:lvl4pPr>
-            <a:lvl5pPr marL="1371600" indent="0" algn="l" defTabSz="685800" rtl="0" eaLnBrk="1" latinLnBrk="0" hangingPunct="1">
-              <a:lnSpc>
-                <a:spcPct val="90000"/>
-              </a:lnSpc>
-              <a:spcBef>
-                <a:spcPts val="375"/>
-              </a:spcBef>
-              <a:buFont typeface="Arial" panose="020B0604020202020204" pitchFamily="34" charset="0"/>
-              <a:buNone/>
-              <a:defRPr sz="1200" kern="1200">
-                <a:solidFill>
-                  <a:schemeClr val="tx1">
-                    <a:tint val="75000"/>
-                  </a:schemeClr>
-                </a:solidFill>
-                <a:latin typeface="+mn-lt"/>
-                <a:ea typeface="+mn-ea"/>
-                <a:cs typeface="+mn-cs"/>
-              </a:defRPr>
-            </a:lvl5pPr>
-            <a:lvl6pPr marL="1714500" indent="0" algn="l" defTabSz="685800" rtl="0" eaLnBrk="1" latinLnBrk="0" hangingPunct="1">
-              <a:lnSpc>
-                <a:spcPct val="90000"/>
-              </a:lnSpc>
-              <a:spcBef>
-                <a:spcPts val="375"/>
-              </a:spcBef>
-              <a:buFont typeface="Arial" panose="020B0604020202020204" pitchFamily="34" charset="0"/>
-              <a:buNone/>
-              <a:defRPr sz="1200" kern="1200">
-                <a:solidFill>
-                  <a:schemeClr val="tx1">
-                    <a:tint val="75000"/>
-                  </a:schemeClr>
-                </a:solidFill>
-                <a:latin typeface="+mn-lt"/>
-                <a:ea typeface="+mn-ea"/>
-                <a:cs typeface="+mn-cs"/>
-              </a:defRPr>
-            </a:lvl6pPr>
-            <a:lvl7pPr marL="2057400" indent="0" algn="l" defTabSz="685800" rtl="0" eaLnBrk="1" latinLnBrk="0" hangingPunct="1">
-              <a:lnSpc>
-                <a:spcPct val="90000"/>
-              </a:lnSpc>
-              <a:spcBef>
-                <a:spcPts val="375"/>
-              </a:spcBef>
-              <a:buFont typeface="Arial" panose="020B0604020202020204" pitchFamily="34" charset="0"/>
-              <a:buNone/>
-              <a:defRPr sz="1200" kern="1200">
-                <a:solidFill>
-                  <a:schemeClr val="tx1">
-                    <a:tint val="75000"/>
-                  </a:schemeClr>
-                </a:solidFill>
-                <a:latin typeface="+mn-lt"/>
-                <a:ea typeface="+mn-ea"/>
-                <a:cs typeface="+mn-cs"/>
-              </a:defRPr>
-            </a:lvl7pPr>
-            <a:lvl8pPr marL="2400300" indent="0" algn="l" defTabSz="685800" rtl="0" eaLnBrk="1" latinLnBrk="0" hangingPunct="1">
-              <a:lnSpc>
-                <a:spcPct val="90000"/>
-              </a:lnSpc>
-              <a:spcBef>
-                <a:spcPts val="375"/>
-              </a:spcBef>
-              <a:buFont typeface="Arial" panose="020B0604020202020204" pitchFamily="34" charset="0"/>
-              <a:buNone/>
-              <a:defRPr sz="1200" kern="1200">
-                <a:solidFill>
-                  <a:schemeClr val="tx1">
-                    <a:tint val="75000"/>
-                  </a:schemeClr>
-                </a:solidFill>
-                <a:latin typeface="+mn-lt"/>
-                <a:ea typeface="+mn-ea"/>
-                <a:cs typeface="+mn-cs"/>
-              </a:defRPr>
-            </a:lvl8pPr>
-            <a:lvl9pPr marL="2743200" indent="0" algn="l" defTabSz="685800" rtl="0" eaLnBrk="1" latinLnBrk="0" hangingPunct="1">
-              <a:lnSpc>
-                <a:spcPct val="90000"/>
-              </a:lnSpc>
-              <a:spcBef>
-                <a:spcPts val="375"/>
-              </a:spcBef>
-              <a:buFont typeface="Arial" panose="020B0604020202020204" pitchFamily="34" charset="0"/>
-              <a:buNone/>
-              <a:defRPr sz="1200" kern="1200">
-                <a:solidFill>
-                  <a:schemeClr val="tx1">
-                    <a:tint val="75000"/>
-                  </a:schemeClr>
-                </a:solidFill>
-                <a:latin typeface="+mn-lt"/>
-                <a:ea typeface="+mn-ea"/>
-                <a:cs typeface="+mn-cs"/>
-              </a:defRPr>
-            </a:lvl9pPr>
-          </a:lstStyle>
-          <a:p>
-            <a:r>
-              <a:rPr lang="en-US" dirty="0"/>
-              <a:t>https://</a:t>
-            </a:r>
-            <a:r>
-              <a:rPr lang="en-US" dirty="0" err="1"/>
-              <a:t>github.com</a:t>
-            </a:r>
-            <a:r>
-              <a:rPr lang="en-US" dirty="0"/>
-              <a:t>/</a:t>
-            </a:r>
-            <a:r>
-              <a:rPr lang="en-US" dirty="0" err="1"/>
-              <a:t>sweirich</a:t>
-            </a:r>
-            <a:r>
-              <a:rPr lang="en-US" dirty="0"/>
-              <a:t>/lambda-n-ways/</a:t>
-            </a:r>
-          </a:p>
-          <a:p>
-            <a:r>
-              <a:rPr lang="en-US" dirty="0" err="1"/>
-              <a:t>Lennart.Simple</a:t>
-            </a:r>
-            <a:r>
-              <a:rPr lang="en-US" dirty="0"/>
-              <a:t>: named implementation from "</a:t>
-            </a:r>
-            <a:r>
-              <a:rPr lang="en-US" dirty="0" err="1"/>
-              <a:t>λ</a:t>
-            </a:r>
-            <a:r>
-              <a:rPr lang="en-US" dirty="0"/>
-              <a:t>-Calculus Cooked Four Ways", with bugfix</a:t>
-            </a:r>
-          </a:p>
-          <a:p>
-            <a:r>
-              <a:rPr lang="en-US" dirty="0" err="1"/>
-              <a:t>Lennart.DeBruijn</a:t>
-            </a:r>
-            <a:r>
-              <a:rPr lang="en-US" dirty="0"/>
-              <a:t>: index implementation from "</a:t>
-            </a:r>
-            <a:r>
-              <a:rPr lang="en-US" dirty="0" err="1"/>
-              <a:t>λ</a:t>
-            </a:r>
-            <a:r>
-              <a:rPr lang="en-US" dirty="0"/>
-              <a:t>-Calculus Cooked Four Ways"</a:t>
-            </a:r>
-          </a:p>
-          <a:p>
-            <a:r>
-              <a:rPr lang="en-US" dirty="0" err="1"/>
-              <a:t>LocallyNameless.Ott</a:t>
-            </a:r>
-            <a:r>
-              <a:rPr lang="en-US" dirty="0"/>
-              <a:t>: Implementation generated by Ott tool, then translated to Haskell</a:t>
-            </a:r>
-          </a:p>
-          <a:p>
-            <a:endParaRPr lang="en-US" dirty="0"/>
-          </a:p>
-        </p:txBody>
-      </p:sp>
     </p:spTree>
     <p:extLst>
       <p:ext uri="{BB962C8B-B14F-4D97-AF65-F5344CB8AC3E}">
@@ -21736,6 +21503,86 @@
   <p:clrMapOvr>
     <a:masterClrMapping/>
   </p:clrMapOvr>
+  <p:timing>
+    <p:tnLst>
+      <p:par>
+        <p:cTn id="1" dur="indefinite" restart="never" nodeType="tmRoot">
+          <p:childTnLst>
+            <p:seq concurrent="1" nextAc="seek">
+              <p:cTn id="2" dur="indefinite" nodeType="mainSeq">
+                <p:childTnLst>
+                  <p:par>
+                    <p:cTn id="3" fill="hold">
+                      <p:stCondLst>
+                        <p:cond delay="indefinite"/>
+                      </p:stCondLst>
+                      <p:childTnLst>
+                        <p:par>
+                          <p:cTn id="4" fill="hold">
+                            <p:stCondLst>
+                              <p:cond delay="0"/>
+                            </p:stCondLst>
+                            <p:childTnLst>
+                              <p:par>
+                                <p:cTn id="5" presetID="1" presetClass="entr" presetSubtype="0" fill="hold" grpId="0" nodeType="clickEffect">
+                                  <p:stCondLst>
+                                    <p:cond delay="0"/>
+                                  </p:stCondLst>
+                                  <p:childTnLst>
+                                    <p:set>
+                                      <p:cBhvr>
+                                        <p:cTn id="6" dur="1" fill="hold">
+                                          <p:stCondLst>
+                                            <p:cond delay="0"/>
+                                          </p:stCondLst>
+                                        </p:cTn>
+                                        <p:tgtEl>
+                                          <p:spTgt spid="5"/>
+                                        </p:tgtEl>
+                                        <p:attrNameLst>
+                                          <p:attrName>style.visibility</p:attrName>
+                                        </p:attrNameLst>
+                                      </p:cBhvr>
+                                      <p:to>
+                                        <p:strVal val="visible"/>
+                                      </p:to>
+                                    </p:set>
+                                  </p:childTnLst>
+                                </p:cTn>
+                              </p:par>
+                            </p:childTnLst>
+                          </p:cTn>
+                        </p:par>
+                      </p:childTnLst>
+                    </p:cTn>
+                  </p:par>
+                </p:childTnLst>
+              </p:cTn>
+              <p:prevCondLst>
+                <p:cond evt="onPrev" delay="0">
+                  <p:tgtEl>
+                    <p:sldTgt/>
+                  </p:tgtEl>
+                </p:cond>
+              </p:prevCondLst>
+              <p:nextCondLst>
+                <p:cond evt="onNext" delay="0">
+                  <p:tgtEl>
+                    <p:sldTgt/>
+                  </p:tgtEl>
+                </p:cond>
+              </p:nextCondLst>
+            </p:seq>
+          </p:childTnLst>
+        </p:cTn>
+      </p:par>
+    </p:tnLst>
+    <p:bldLst>
+      <p:bldGraphic spid="5" grpId="0">
+        <p:bldAsOne/>
+      </p:bldGraphic>
+    </p:bldLst>
+  </p:timing>
 </p:sld>
 </file>
 
@@ -23326,6 +23173,13 @@
             <a:pPr lvl="1"/>
             <a:r>
               <a:rPr lang="en-US" sz="2000" dirty="0"/>
+              <a:t>Find fresh variables quickly</a:t>
+            </a:r>
+          </a:p>
+          <a:p>
+            <a:pPr lvl="1"/>
+            <a:r>
+              <a:rPr lang="en-US" sz="2000" dirty="0"/>
               <a:t>Can cut off substitution early if domain doesn't affect free variables</a:t>
             </a:r>
           </a:p>
@@ -23334,13 +23188,6 @@
             <a:r>
               <a:rPr lang="en-US" sz="2000" dirty="0"/>
               <a:t>Fuse renaming substitutions with normal substitutions</a:t>
-            </a:r>
-          </a:p>
-          <a:p>
-            <a:pPr lvl="1"/>
-            <a:r>
-              <a:rPr lang="en-US" sz="2000" dirty="0"/>
-              <a:t>Find fresh variables quickly</a:t>
             </a:r>
           </a:p>
         </p:txBody>
@@ -23884,14 +23731,14 @@
             <a:pPr lvl="1"/>
             <a:r>
               <a:rPr lang="en-US" sz="2100" dirty="0"/>
+              <a:t>Compose substitutions using smart constructors</a:t>
+            </a:r>
+          </a:p>
+          <a:p>
+            <a:pPr lvl="1"/>
+            <a:r>
+              <a:rPr lang="en-US" sz="2100" dirty="0"/>
               <a:t>Fewer traversals: multiple indices replaced simultaneously</a:t>
-            </a:r>
-          </a:p>
-          <a:p>
-            <a:pPr lvl="1"/>
-            <a:r>
-              <a:rPr lang="en-US" sz="2100" dirty="0"/>
-              <a:t>Compose substitutions using smart constructors</a:t>
             </a:r>
           </a:p>
         </p:txBody>
@@ -28288,7 +28135,7 @@
           <a:p>
             <a:r>
               <a:rPr lang="en-US" dirty="0"/>
-              <a:t>Haskell implementation</a:t>
+              <a:t>Haskell implementation?</a:t>
             </a:r>
           </a:p>
         </p:txBody>
@@ -30834,7 +30681,7 @@
                   <a:schemeClr val="accent1"/>
                 </a:solidFill>
               </a:rPr>
-              <a:t>Too many answers</a:t>
+              <a:t>Too many approaches</a:t>
             </a:r>
             <a:endParaRPr lang="en-US" dirty="0">
               <a:solidFill>
@@ -31147,6 +30994,13 @@
             <a:pPr lvl="1"/>
             <a:r>
               <a:rPr lang="en-US" sz="2200" dirty="0"/>
+              <a:t>Proofs are important, some designed to be "easier to reason about" </a:t>
+            </a:r>
+          </a:p>
+          <a:p>
+            <a:pPr lvl="1"/>
+            <a:r>
+              <a:rPr lang="en-US" sz="2200" dirty="0"/>
               <a:t>Subtle bugs are common, some designed to be "easier to implement"</a:t>
             </a:r>
           </a:p>
@@ -31155,13 +31009,6 @@
             <a:r>
               <a:rPr lang="en-US" sz="2200" dirty="0"/>
               <a:t>Subtle bugs are common, some designed to be "easier to use"</a:t>
-            </a:r>
-          </a:p>
-          <a:p>
-            <a:pPr lvl="1"/>
-            <a:r>
-              <a:rPr lang="en-US" sz="2200" dirty="0"/>
-              <a:t>Proofs are important, some designed to be "easier to reason about" </a:t>
             </a:r>
           </a:p>
           <a:p>
@@ -31181,7 +31028,7 @@
             </a:r>
             <a:r>
               <a:rPr lang="en-US" sz="2800" b="1" dirty="0"/>
-              <a:t>which should you use if you care about all of these?  </a:t>
+              <a:t>which should you use if you care about all of these things?  </a:t>
             </a:r>
             <a:r>
               <a:rPr lang="en-US" sz="2800" dirty="0"/>
@@ -31794,7 +31641,7 @@
           <a:p>
             <a:r>
               <a:rPr lang="en-US" sz="2400" dirty="0"/>
-              <a:t>Three common approaches </a:t>
+              <a:t>Overview of three common approaches </a:t>
             </a:r>
           </a:p>
           <a:p>
@@ -31821,8 +31668,9 @@
           <a:p>
             <a:r>
               <a:rPr lang="en-US" sz="2400" dirty="0"/>
-              <a:t> Compare implementations of normalization, which uses capture-avoiding substitution</a:t>
-            </a:r>
+              <a:t> Compare implementations </a:t>
+            </a:r>
+            <a:endParaRPr lang="en-US" sz="2100" dirty="0"/>
           </a:p>
           <a:p>
             <a:pPr lvl="1"/>

</xml_diff>